<commit_message>
Mejora de matriz de consistencia
</commit_message>
<xml_diff>
--- a/TESIS AVANCES Y DOCUMENTOS RELACIONADOS/Estado del arte - ACTUALIZABLE.pptx
+++ b/TESIS AVANCES Y DOCUMENTOS RELACIONADOS/Estado del arte - ACTUALIZABLE.pptx
@@ -11,6 +11,8 @@
     <p:sldId id="259" r:id="rId5"/>
     <p:sldId id="260" r:id="rId6"/>
     <p:sldId id="261" r:id="rId7"/>
+    <p:sldId id="262" r:id="rId8"/>
+    <p:sldId id="263" r:id="rId9"/>
   </p:sldIdLst>
   <p:sldSz cx="12192000" cy="6858000"/>
   <p:notesSz cx="6858000" cy="9144000"/>
@@ -109,6 +111,11 @@
       </a:defRPr>
     </a:lvl9pPr>
   </p:defaultTextStyle>
+  <p:extLst>
+    <p:ext uri="{EFAFB233-063F-42B5-8137-9DF3F51BA10A}">
+      <p15:sldGuideLst xmlns:p15="http://schemas.microsoft.com/office/powerpoint/2012/main"/>
+    </p:ext>
+  </p:extLst>
 </p:presentation>
 </file>
 
@@ -8860,6 +8867,1980 @@
 </p:sld>
 </file>
 
+<file path=ppt/slides/slide7.xml><?xml version="1.0" encoding="utf-8"?>
+<p:sld xmlns:a="http://schemas.openxmlformats.org/drawingml/2006/main" xmlns:r="http://schemas.openxmlformats.org/officeDocument/2006/relationships" xmlns:p="http://schemas.openxmlformats.org/presentationml/2006/main">
+  <p:cSld>
+    <p:spTree>
+      <p:nvGrpSpPr>
+        <p:cNvPr id="1" name=""/>
+        <p:cNvGrpSpPr/>
+        <p:nvPr/>
+      </p:nvGrpSpPr>
+      <p:grpSpPr>
+        <a:xfrm>
+          <a:off x="0" y="0"/>
+          <a:ext cx="0" cy="0"/>
+          <a:chOff x="0" y="0"/>
+          <a:chExt cx="0" cy="0"/>
+        </a:xfrm>
+      </p:grpSpPr>
+      <p:sp>
+        <p:nvSpPr>
+          <p:cNvPr id="2" name="Título 1">
+            <a:extLst>
+              <a:ext uri="{FF2B5EF4-FFF2-40B4-BE49-F238E27FC236}">
+                <a16:creationId xmlns:a16="http://schemas.microsoft.com/office/drawing/2014/main" id="{E7A01A16-EB5D-EDFE-23D6-77D0CA512CB3}"/>
+              </a:ext>
+            </a:extLst>
+          </p:cNvPr>
+          <p:cNvSpPr>
+            <a:spLocks noGrp="1"/>
+          </p:cNvSpPr>
+          <p:nvPr>
+            <p:ph type="title"/>
+          </p:nvPr>
+        </p:nvSpPr>
+        <p:spPr/>
+        <p:txBody>
+          <a:bodyPr>
+            <a:noAutofit/>
+          </a:bodyPr>
+          <a:lstStyle/>
+          <a:p>
+            <a:r>
+              <a:rPr lang="en-US" sz="3200" dirty="0"/>
+              <a:t>Detection and Classification of Diabetic Retinopathy</a:t>
+            </a:r>
+            <a:br>
+              <a:rPr lang="en-US" sz="3200" dirty="0"/>
+            </a:br>
+            <a:r>
+              <a:rPr lang="en-US" sz="3200" dirty="0"/>
+              <a:t>using Deep Learning</a:t>
+            </a:r>
+            <a:endParaRPr lang="es-ES" sz="3200" dirty="0"/>
+          </a:p>
+        </p:txBody>
+      </p:sp>
+      <p:pic>
+        <p:nvPicPr>
+          <p:cNvPr id="5" name="Imagen 4">
+            <a:extLst>
+              <a:ext uri="{FF2B5EF4-FFF2-40B4-BE49-F238E27FC236}">
+                <a16:creationId xmlns:a16="http://schemas.microsoft.com/office/drawing/2014/main" id="{CFA7A349-7250-0E9D-D149-9A091CABBAC3}"/>
+              </a:ext>
+            </a:extLst>
+          </p:cNvPr>
+          <p:cNvPicPr>
+            <a:picLocks noChangeAspect="1"/>
+          </p:cNvPicPr>
+          <p:nvPr/>
+        </p:nvPicPr>
+        <p:blipFill>
+          <a:blip r:embed="rId2"/>
+          <a:stretch>
+            <a:fillRect/>
+          </a:stretch>
+        </p:blipFill>
+        <p:spPr>
+          <a:xfrm>
+            <a:off x="9972675" y="52364"/>
+            <a:ext cx="2047959" cy="485776"/>
+          </a:xfrm>
+          <a:prstGeom prst="rect">
+            <a:avLst/>
+          </a:prstGeom>
+        </p:spPr>
+      </p:pic>
+      <p:sp>
+        <p:nvSpPr>
+          <p:cNvPr id="6" name="Título 1">
+            <a:extLst>
+              <a:ext uri="{FF2B5EF4-FFF2-40B4-BE49-F238E27FC236}">
+                <a16:creationId xmlns:a16="http://schemas.microsoft.com/office/drawing/2014/main" id="{F2D15490-C613-733D-B535-5F94C2CFFA59}"/>
+              </a:ext>
+            </a:extLst>
+          </p:cNvPr>
+          <p:cNvSpPr txBox="1">
+            <a:spLocks/>
+          </p:cNvSpPr>
+          <p:nvPr/>
+        </p:nvSpPr>
+        <p:spPr>
+          <a:xfrm>
+            <a:off x="571499" y="264818"/>
+            <a:ext cx="2295526" cy="244346"/>
+          </a:xfrm>
+          <a:prstGeom prst="rect">
+            <a:avLst/>
+          </a:prstGeom>
+        </p:spPr>
+        <p:txBody>
+          <a:bodyPr vert="horz" lIns="91440" tIns="45720" rIns="91440" bIns="45720" rtlCol="0" anchor="ctr">
+            <a:noAutofit/>
+          </a:bodyPr>
+          <a:lstStyle>
+            <a:lvl1pPr algn="l" defTabSz="914400" rtl="0" eaLnBrk="1" latinLnBrk="0" hangingPunct="1">
+              <a:lnSpc>
+                <a:spcPct val="90000"/>
+              </a:lnSpc>
+              <a:spcBef>
+                <a:spcPct val="0"/>
+              </a:spcBef>
+              <a:buNone/>
+              <a:defRPr sz="4000" kern="1200" spc="-100" baseline="0">
+                <a:solidFill>
+                  <a:schemeClr val="tx1"/>
+                </a:solidFill>
+                <a:latin typeface="Batang" panose="02030600000101010101" pitchFamily="18" charset="-127"/>
+                <a:ea typeface="Batang" panose="02030600000101010101" pitchFamily="18" charset="-127"/>
+                <a:cs typeface="+mj-cs"/>
+              </a:defRPr>
+            </a:lvl1pPr>
+          </a:lstStyle>
+          <a:p>
+            <a:r>
+              <a:rPr lang="es-PE" sz="1400" dirty="0"/>
+              <a:t>P</a:t>
+            </a:r>
+            <a:r>
+              <a:rPr lang="es-ES" sz="1400" dirty="0" err="1"/>
+              <a:t>aper</a:t>
+            </a:r>
+            <a:r>
+              <a:rPr lang="es-ES" sz="1400" dirty="0"/>
+              <a:t> relacionado 1</a:t>
+            </a:r>
+          </a:p>
+        </p:txBody>
+      </p:sp>
+      <p:sp>
+        <p:nvSpPr>
+          <p:cNvPr id="10" name="Rectángulo 9">
+            <a:extLst>
+              <a:ext uri="{FF2B5EF4-FFF2-40B4-BE49-F238E27FC236}">
+                <a16:creationId xmlns:a16="http://schemas.microsoft.com/office/drawing/2014/main" id="{6BA0718A-3228-2695-F3BE-F8D8ACB4C3F6}"/>
+              </a:ext>
+            </a:extLst>
+          </p:cNvPr>
+          <p:cNvSpPr/>
+          <p:nvPr/>
+        </p:nvSpPr>
+        <p:spPr>
+          <a:xfrm>
+            <a:off x="1601879" y="2431424"/>
+            <a:ext cx="1653992" cy="461665"/>
+          </a:xfrm>
+          <a:prstGeom prst="rect">
+            <a:avLst/>
+          </a:prstGeom>
+          <a:noFill/>
+        </p:spPr>
+        <p:txBody>
+          <a:bodyPr wrap="square" lIns="91440" tIns="45720" rIns="91440" bIns="45720">
+            <a:spAutoFit/>
+          </a:bodyPr>
+          <a:lstStyle/>
+          <a:p>
+            <a:pPr algn="ctr"/>
+            <a:r>
+              <a:rPr lang="es-PE" sz="2400" dirty="0">
+                <a:ln w="0"/>
+                <a:effectLst>
+                  <a:outerShdw blurRad="38100" dist="19050" dir="2700000" algn="tl" rotWithShape="0">
+                    <a:schemeClr val="dk1">
+                      <a:alpha val="40000"/>
+                    </a:schemeClr>
+                  </a:outerShdw>
+                </a:effectLst>
+              </a:rPr>
+              <a:t>O</a:t>
+            </a:r>
+            <a:r>
+              <a:rPr lang="es-ES" sz="2400" dirty="0" err="1">
+                <a:ln w="0"/>
+                <a:effectLst>
+                  <a:outerShdw blurRad="38100" dist="19050" dir="2700000" algn="tl" rotWithShape="0">
+                    <a:schemeClr val="dk1">
+                      <a:alpha val="40000"/>
+                    </a:schemeClr>
+                  </a:outerShdw>
+                </a:effectLst>
+              </a:rPr>
+              <a:t>bjetivos</a:t>
+            </a:r>
+            <a:endParaRPr lang="es-ES" sz="2400" b="0" cap="none" spc="0" dirty="0">
+              <a:ln w="0"/>
+              <a:solidFill>
+                <a:schemeClr val="tx1"/>
+              </a:solidFill>
+              <a:effectLst>
+                <a:outerShdw blurRad="38100" dist="19050" dir="2700000" algn="tl" rotWithShape="0">
+                  <a:schemeClr val="dk1">
+                    <a:alpha val="40000"/>
+                  </a:schemeClr>
+                </a:outerShdw>
+              </a:effectLst>
+            </a:endParaRPr>
+          </a:p>
+        </p:txBody>
+      </p:sp>
+      <p:sp>
+        <p:nvSpPr>
+          <p:cNvPr id="11" name="Rectángulo 10">
+            <a:extLst>
+              <a:ext uri="{FF2B5EF4-FFF2-40B4-BE49-F238E27FC236}">
+                <a16:creationId xmlns:a16="http://schemas.microsoft.com/office/drawing/2014/main" id="{56B91C12-7C3B-2EBD-6289-16A0400BAB0B}"/>
+              </a:ext>
+            </a:extLst>
+          </p:cNvPr>
+          <p:cNvSpPr/>
+          <p:nvPr/>
+        </p:nvSpPr>
+        <p:spPr>
+          <a:xfrm>
+            <a:off x="5025277" y="2431424"/>
+            <a:ext cx="2141446" cy="461665"/>
+          </a:xfrm>
+          <a:prstGeom prst="rect">
+            <a:avLst/>
+          </a:prstGeom>
+          <a:noFill/>
+        </p:spPr>
+        <p:txBody>
+          <a:bodyPr wrap="square" lIns="91440" tIns="45720" rIns="91440" bIns="45720">
+            <a:spAutoFit/>
+          </a:bodyPr>
+          <a:lstStyle/>
+          <a:p>
+            <a:pPr algn="ctr"/>
+            <a:r>
+              <a:rPr lang="es-PE" sz="2400" b="0" cap="none" spc="0" dirty="0">
+                <a:ln w="0"/>
+                <a:solidFill>
+                  <a:schemeClr val="tx1"/>
+                </a:solidFill>
+                <a:effectLst>
+                  <a:outerShdw blurRad="38100" dist="19050" dir="2700000" algn="tl" rotWithShape="0">
+                    <a:schemeClr val="dk1">
+                      <a:alpha val="40000"/>
+                    </a:schemeClr>
+                  </a:outerShdw>
+                </a:effectLst>
+              </a:rPr>
+              <a:t>Metodología</a:t>
+            </a:r>
+            <a:endParaRPr lang="es-ES" sz="2400" b="0" cap="none" spc="0" dirty="0">
+              <a:ln w="0"/>
+              <a:solidFill>
+                <a:schemeClr val="tx1"/>
+              </a:solidFill>
+              <a:effectLst>
+                <a:outerShdw blurRad="38100" dist="19050" dir="2700000" algn="tl" rotWithShape="0">
+                  <a:schemeClr val="dk1">
+                    <a:alpha val="40000"/>
+                  </a:schemeClr>
+                </a:outerShdw>
+              </a:effectLst>
+            </a:endParaRPr>
+          </a:p>
+        </p:txBody>
+      </p:sp>
+      <p:sp>
+        <p:nvSpPr>
+          <p:cNvPr id="12" name="Rectángulo 11">
+            <a:extLst>
+              <a:ext uri="{FF2B5EF4-FFF2-40B4-BE49-F238E27FC236}">
+                <a16:creationId xmlns:a16="http://schemas.microsoft.com/office/drawing/2014/main" id="{B912E60C-28E0-A363-F916-9CECB28373C2}"/>
+              </a:ext>
+            </a:extLst>
+          </p:cNvPr>
+          <p:cNvSpPr/>
+          <p:nvPr/>
+        </p:nvSpPr>
+        <p:spPr>
+          <a:xfrm>
+            <a:off x="9120187" y="2431424"/>
+            <a:ext cx="1704975" cy="461665"/>
+          </a:xfrm>
+          <a:prstGeom prst="rect">
+            <a:avLst/>
+          </a:prstGeom>
+          <a:noFill/>
+        </p:spPr>
+        <p:txBody>
+          <a:bodyPr wrap="square" lIns="91440" tIns="45720" rIns="91440" bIns="45720">
+            <a:spAutoFit/>
+          </a:bodyPr>
+          <a:lstStyle/>
+          <a:p>
+            <a:pPr algn="ctr"/>
+            <a:r>
+              <a:rPr lang="es-PE" sz="2400" dirty="0">
+                <a:ln w="0"/>
+                <a:effectLst>
+                  <a:outerShdw blurRad="38100" dist="19050" dir="2700000" algn="tl" rotWithShape="0">
+                    <a:schemeClr val="dk1">
+                      <a:alpha val="40000"/>
+                    </a:schemeClr>
+                  </a:outerShdw>
+                </a:effectLst>
+              </a:rPr>
+              <a:t>Resultados</a:t>
+            </a:r>
+            <a:endParaRPr lang="es-ES" sz="2400" b="0" cap="none" spc="0" dirty="0">
+              <a:ln w="0"/>
+              <a:solidFill>
+                <a:schemeClr val="tx1"/>
+              </a:solidFill>
+              <a:effectLst>
+                <a:outerShdw blurRad="38100" dist="19050" dir="2700000" algn="tl" rotWithShape="0">
+                  <a:schemeClr val="dk1">
+                    <a:alpha val="40000"/>
+                  </a:schemeClr>
+                </a:outerShdw>
+              </a:effectLst>
+            </a:endParaRPr>
+          </a:p>
+        </p:txBody>
+      </p:sp>
+      <p:sp>
+        <p:nvSpPr>
+          <p:cNvPr id="4" name="Marcador de contenido 7">
+            <a:extLst>
+              <a:ext uri="{FF2B5EF4-FFF2-40B4-BE49-F238E27FC236}">
+                <a16:creationId xmlns:a16="http://schemas.microsoft.com/office/drawing/2014/main" id="{780BD072-81D5-55D6-D27F-101238DD8926}"/>
+              </a:ext>
+            </a:extLst>
+          </p:cNvPr>
+          <p:cNvSpPr txBox="1">
+            <a:spLocks/>
+          </p:cNvSpPr>
+          <p:nvPr/>
+        </p:nvSpPr>
+        <p:spPr>
+          <a:xfrm>
+            <a:off x="8477251" y="3045486"/>
+            <a:ext cx="2743200" cy="3008923"/>
+          </a:xfrm>
+          <a:prstGeom prst="rect">
+            <a:avLst/>
+          </a:prstGeom>
+        </p:spPr>
+        <p:txBody>
+          <a:bodyPr vert="horz" lIns="91440" tIns="45720" rIns="91440" bIns="45720" rtlCol="0">
+            <a:normAutofit/>
+          </a:bodyPr>
+          <a:lstStyle>
+            <a:lvl1pPr marL="228600" indent="-228600" algn="l" defTabSz="914400" rtl="0" eaLnBrk="1" latinLnBrk="0" hangingPunct="1">
+              <a:lnSpc>
+                <a:spcPct val="120000"/>
+              </a:lnSpc>
+              <a:spcBef>
+                <a:spcPts val="1000"/>
+              </a:spcBef>
+              <a:buSzPct val="80000"/>
+              <a:buFont typeface="Arial" panose="020B0604020202020204" pitchFamily="34" charset="0"/>
+              <a:buChar char="•"/>
+              <a:defRPr sz="2000" kern="1200">
+                <a:solidFill>
+                  <a:schemeClr val="tx1"/>
+                </a:solidFill>
+                <a:latin typeface="+mn-lt"/>
+                <a:ea typeface="+mn-ea"/>
+                <a:cs typeface="+mn-cs"/>
+              </a:defRPr>
+            </a:lvl1pPr>
+            <a:lvl2pPr marL="457200" indent="-228600" algn="l" defTabSz="914400" rtl="0" eaLnBrk="1" latinLnBrk="0" hangingPunct="1">
+              <a:lnSpc>
+                <a:spcPct val="120000"/>
+              </a:lnSpc>
+              <a:spcBef>
+                <a:spcPts val="500"/>
+              </a:spcBef>
+              <a:buSzPct val="80000"/>
+              <a:buFont typeface="Avenir Next LT Pro Light" panose="020B0304020202020204" pitchFamily="34" charset="0"/>
+              <a:buChar char="–"/>
+              <a:defRPr sz="1800" kern="1200">
+                <a:solidFill>
+                  <a:schemeClr val="tx1"/>
+                </a:solidFill>
+                <a:latin typeface="+mn-lt"/>
+                <a:ea typeface="+mn-ea"/>
+                <a:cs typeface="+mn-cs"/>
+              </a:defRPr>
+            </a:lvl2pPr>
+            <a:lvl3pPr marL="731520" indent="-228600" algn="l" defTabSz="914400" rtl="0" eaLnBrk="1" latinLnBrk="0" hangingPunct="1">
+              <a:lnSpc>
+                <a:spcPct val="120000"/>
+              </a:lnSpc>
+              <a:spcBef>
+                <a:spcPts val="500"/>
+              </a:spcBef>
+              <a:buSzPct val="80000"/>
+              <a:buFont typeface="Arial" panose="020B0604020202020204" pitchFamily="34" charset="0"/>
+              <a:buChar char="•"/>
+              <a:defRPr sz="1600" kern="1200">
+                <a:solidFill>
+                  <a:schemeClr val="tx1"/>
+                </a:solidFill>
+                <a:latin typeface="+mn-lt"/>
+                <a:ea typeface="+mn-ea"/>
+                <a:cs typeface="+mn-cs"/>
+              </a:defRPr>
+            </a:lvl3pPr>
+            <a:lvl4pPr marL="1005840" indent="-228600" algn="l" defTabSz="914400" rtl="0" eaLnBrk="1" latinLnBrk="0" hangingPunct="1">
+              <a:lnSpc>
+                <a:spcPct val="120000"/>
+              </a:lnSpc>
+              <a:spcBef>
+                <a:spcPts val="500"/>
+              </a:spcBef>
+              <a:buSzPct val="80000"/>
+              <a:buFont typeface="Avenir Next LT Pro Light" panose="020B0304020202020204" pitchFamily="34" charset="0"/>
+              <a:buChar char="–"/>
+              <a:defRPr sz="1400" kern="1200">
+                <a:solidFill>
+                  <a:schemeClr val="tx1"/>
+                </a:solidFill>
+                <a:latin typeface="+mn-lt"/>
+                <a:ea typeface="+mn-ea"/>
+                <a:cs typeface="+mn-cs"/>
+              </a:defRPr>
+            </a:lvl4pPr>
+            <a:lvl5pPr marL="1280160" indent="-228600" algn="l" defTabSz="914400" rtl="0" eaLnBrk="1" latinLnBrk="0" hangingPunct="1">
+              <a:lnSpc>
+                <a:spcPct val="120000"/>
+              </a:lnSpc>
+              <a:spcBef>
+                <a:spcPts val="500"/>
+              </a:spcBef>
+              <a:buSzPct val="80000"/>
+              <a:buFont typeface="Arial" panose="020B0604020202020204" pitchFamily="34" charset="0"/>
+              <a:buChar char="•"/>
+              <a:defRPr sz="1400" kern="1200">
+                <a:solidFill>
+                  <a:schemeClr val="tx1"/>
+                </a:solidFill>
+                <a:latin typeface="+mn-lt"/>
+                <a:ea typeface="+mn-ea"/>
+                <a:cs typeface="+mn-cs"/>
+              </a:defRPr>
+            </a:lvl5pPr>
+            <a:lvl6pPr marL="2514600" indent="-228600" algn="l" defTabSz="914400" rtl="0" eaLnBrk="1" latinLnBrk="0" hangingPunct="1">
+              <a:lnSpc>
+                <a:spcPct val="90000"/>
+              </a:lnSpc>
+              <a:spcBef>
+                <a:spcPts val="500"/>
+              </a:spcBef>
+              <a:buFont typeface="Arial" panose="020B0604020202020204" pitchFamily="34" charset="0"/>
+              <a:buChar char="•"/>
+              <a:defRPr sz="1800" kern="1200">
+                <a:solidFill>
+                  <a:schemeClr val="tx1"/>
+                </a:solidFill>
+                <a:latin typeface="+mn-lt"/>
+                <a:ea typeface="+mn-ea"/>
+                <a:cs typeface="+mn-cs"/>
+              </a:defRPr>
+            </a:lvl6pPr>
+            <a:lvl7pPr marL="2971800" indent="-228600" algn="l" defTabSz="914400" rtl="0" eaLnBrk="1" latinLnBrk="0" hangingPunct="1">
+              <a:lnSpc>
+                <a:spcPct val="90000"/>
+              </a:lnSpc>
+              <a:spcBef>
+                <a:spcPts val="500"/>
+              </a:spcBef>
+              <a:buFont typeface="Arial" panose="020B0604020202020204" pitchFamily="34" charset="0"/>
+              <a:buChar char="•"/>
+              <a:defRPr sz="1800" kern="1200">
+                <a:solidFill>
+                  <a:schemeClr val="tx1"/>
+                </a:solidFill>
+                <a:latin typeface="+mn-lt"/>
+                <a:ea typeface="+mn-ea"/>
+                <a:cs typeface="+mn-cs"/>
+              </a:defRPr>
+            </a:lvl7pPr>
+            <a:lvl8pPr marL="3429000" indent="-228600" algn="l" defTabSz="914400" rtl="0" eaLnBrk="1" latinLnBrk="0" hangingPunct="1">
+              <a:lnSpc>
+                <a:spcPct val="90000"/>
+              </a:lnSpc>
+              <a:spcBef>
+                <a:spcPts val="500"/>
+              </a:spcBef>
+              <a:buFont typeface="Arial" panose="020B0604020202020204" pitchFamily="34" charset="0"/>
+              <a:buChar char="•"/>
+              <a:defRPr sz="1800" kern="1200">
+                <a:solidFill>
+                  <a:schemeClr val="tx1"/>
+                </a:solidFill>
+                <a:latin typeface="+mn-lt"/>
+                <a:ea typeface="+mn-ea"/>
+                <a:cs typeface="+mn-cs"/>
+              </a:defRPr>
+            </a:lvl8pPr>
+            <a:lvl9pPr marL="3886200" indent="-228600" algn="l" defTabSz="914400" rtl="0" eaLnBrk="1" latinLnBrk="0" hangingPunct="1">
+              <a:lnSpc>
+                <a:spcPct val="90000"/>
+              </a:lnSpc>
+              <a:spcBef>
+                <a:spcPts val="500"/>
+              </a:spcBef>
+              <a:buFont typeface="Arial" panose="020B0604020202020204" pitchFamily="34" charset="0"/>
+              <a:buChar char="•"/>
+              <a:defRPr sz="1800" kern="1200">
+                <a:solidFill>
+                  <a:schemeClr val="tx1"/>
+                </a:solidFill>
+                <a:latin typeface="+mn-lt"/>
+                <a:ea typeface="+mn-ea"/>
+                <a:cs typeface="+mn-cs"/>
+              </a:defRPr>
+            </a:lvl9pPr>
+          </a:lstStyle>
+          <a:p>
+            <a:pPr algn="just"/>
+            <a:r>
+              <a:rPr lang="es-ES" sz="1600" dirty="0"/>
+              <a:t>El modelo entrenado logró una precisión del 47 % durante las pruebas, lo que demuestra la eficacia del enfoque de aprendizaje profundo en la clasificación de las etapas de recuperación ante desastres.</a:t>
+            </a:r>
+          </a:p>
+        </p:txBody>
+      </p:sp>
+      <p:sp>
+        <p:nvSpPr>
+          <p:cNvPr id="7" name="Marcador de contenido 7">
+            <a:extLst>
+              <a:ext uri="{FF2B5EF4-FFF2-40B4-BE49-F238E27FC236}">
+                <a16:creationId xmlns:a16="http://schemas.microsoft.com/office/drawing/2014/main" id="{E0121BB7-FF79-C541-F79F-B8C5ACAF862A}"/>
+              </a:ext>
+            </a:extLst>
+          </p:cNvPr>
+          <p:cNvSpPr txBox="1">
+            <a:spLocks/>
+          </p:cNvSpPr>
+          <p:nvPr/>
+        </p:nvSpPr>
+        <p:spPr>
+          <a:xfrm>
+            <a:off x="4724401" y="3045485"/>
+            <a:ext cx="2743200" cy="3409744"/>
+          </a:xfrm>
+          <a:prstGeom prst="rect">
+            <a:avLst/>
+          </a:prstGeom>
+        </p:spPr>
+        <p:txBody>
+          <a:bodyPr vert="horz" lIns="91440" tIns="45720" rIns="91440" bIns="45720" rtlCol="0">
+            <a:normAutofit fontScale="92500" lnSpcReduction="20000"/>
+          </a:bodyPr>
+          <a:lstStyle>
+            <a:lvl1pPr marL="228600" indent="-228600" algn="l" defTabSz="914400" rtl="0" eaLnBrk="1" latinLnBrk="0" hangingPunct="1">
+              <a:lnSpc>
+                <a:spcPct val="120000"/>
+              </a:lnSpc>
+              <a:spcBef>
+                <a:spcPts val="1000"/>
+              </a:spcBef>
+              <a:buSzPct val="80000"/>
+              <a:buFont typeface="Arial" panose="020B0604020202020204" pitchFamily="34" charset="0"/>
+              <a:buChar char="•"/>
+              <a:defRPr sz="2000" kern="1200">
+                <a:solidFill>
+                  <a:schemeClr val="tx1"/>
+                </a:solidFill>
+                <a:latin typeface="+mn-lt"/>
+                <a:ea typeface="+mn-ea"/>
+                <a:cs typeface="+mn-cs"/>
+              </a:defRPr>
+            </a:lvl1pPr>
+            <a:lvl2pPr marL="457200" indent="-228600" algn="l" defTabSz="914400" rtl="0" eaLnBrk="1" latinLnBrk="0" hangingPunct="1">
+              <a:lnSpc>
+                <a:spcPct val="120000"/>
+              </a:lnSpc>
+              <a:spcBef>
+                <a:spcPts val="500"/>
+              </a:spcBef>
+              <a:buSzPct val="80000"/>
+              <a:buFont typeface="Avenir Next LT Pro Light" panose="020B0304020202020204" pitchFamily="34" charset="0"/>
+              <a:buChar char="–"/>
+              <a:defRPr sz="1800" kern="1200">
+                <a:solidFill>
+                  <a:schemeClr val="tx1"/>
+                </a:solidFill>
+                <a:latin typeface="+mn-lt"/>
+                <a:ea typeface="+mn-ea"/>
+                <a:cs typeface="+mn-cs"/>
+              </a:defRPr>
+            </a:lvl2pPr>
+            <a:lvl3pPr marL="731520" indent="-228600" algn="l" defTabSz="914400" rtl="0" eaLnBrk="1" latinLnBrk="0" hangingPunct="1">
+              <a:lnSpc>
+                <a:spcPct val="120000"/>
+              </a:lnSpc>
+              <a:spcBef>
+                <a:spcPts val="500"/>
+              </a:spcBef>
+              <a:buSzPct val="80000"/>
+              <a:buFont typeface="Arial" panose="020B0604020202020204" pitchFamily="34" charset="0"/>
+              <a:buChar char="•"/>
+              <a:defRPr sz="1600" kern="1200">
+                <a:solidFill>
+                  <a:schemeClr val="tx1"/>
+                </a:solidFill>
+                <a:latin typeface="+mn-lt"/>
+                <a:ea typeface="+mn-ea"/>
+                <a:cs typeface="+mn-cs"/>
+              </a:defRPr>
+            </a:lvl3pPr>
+            <a:lvl4pPr marL="1005840" indent="-228600" algn="l" defTabSz="914400" rtl="0" eaLnBrk="1" latinLnBrk="0" hangingPunct="1">
+              <a:lnSpc>
+                <a:spcPct val="120000"/>
+              </a:lnSpc>
+              <a:spcBef>
+                <a:spcPts val="500"/>
+              </a:spcBef>
+              <a:buSzPct val="80000"/>
+              <a:buFont typeface="Avenir Next LT Pro Light" panose="020B0304020202020204" pitchFamily="34" charset="0"/>
+              <a:buChar char="–"/>
+              <a:defRPr sz="1400" kern="1200">
+                <a:solidFill>
+                  <a:schemeClr val="tx1"/>
+                </a:solidFill>
+                <a:latin typeface="+mn-lt"/>
+                <a:ea typeface="+mn-ea"/>
+                <a:cs typeface="+mn-cs"/>
+              </a:defRPr>
+            </a:lvl4pPr>
+            <a:lvl5pPr marL="1280160" indent="-228600" algn="l" defTabSz="914400" rtl="0" eaLnBrk="1" latinLnBrk="0" hangingPunct="1">
+              <a:lnSpc>
+                <a:spcPct val="120000"/>
+              </a:lnSpc>
+              <a:spcBef>
+                <a:spcPts val="500"/>
+              </a:spcBef>
+              <a:buSzPct val="80000"/>
+              <a:buFont typeface="Arial" panose="020B0604020202020204" pitchFamily="34" charset="0"/>
+              <a:buChar char="•"/>
+              <a:defRPr sz="1400" kern="1200">
+                <a:solidFill>
+                  <a:schemeClr val="tx1"/>
+                </a:solidFill>
+                <a:latin typeface="+mn-lt"/>
+                <a:ea typeface="+mn-ea"/>
+                <a:cs typeface="+mn-cs"/>
+              </a:defRPr>
+            </a:lvl5pPr>
+            <a:lvl6pPr marL="2514600" indent="-228600" algn="l" defTabSz="914400" rtl="0" eaLnBrk="1" latinLnBrk="0" hangingPunct="1">
+              <a:lnSpc>
+                <a:spcPct val="90000"/>
+              </a:lnSpc>
+              <a:spcBef>
+                <a:spcPts val="500"/>
+              </a:spcBef>
+              <a:buFont typeface="Arial" panose="020B0604020202020204" pitchFamily="34" charset="0"/>
+              <a:buChar char="•"/>
+              <a:defRPr sz="1800" kern="1200">
+                <a:solidFill>
+                  <a:schemeClr val="tx1"/>
+                </a:solidFill>
+                <a:latin typeface="+mn-lt"/>
+                <a:ea typeface="+mn-ea"/>
+                <a:cs typeface="+mn-cs"/>
+              </a:defRPr>
+            </a:lvl6pPr>
+            <a:lvl7pPr marL="2971800" indent="-228600" algn="l" defTabSz="914400" rtl="0" eaLnBrk="1" latinLnBrk="0" hangingPunct="1">
+              <a:lnSpc>
+                <a:spcPct val="90000"/>
+              </a:lnSpc>
+              <a:spcBef>
+                <a:spcPts val="500"/>
+              </a:spcBef>
+              <a:buFont typeface="Arial" panose="020B0604020202020204" pitchFamily="34" charset="0"/>
+              <a:buChar char="•"/>
+              <a:defRPr sz="1800" kern="1200">
+                <a:solidFill>
+                  <a:schemeClr val="tx1"/>
+                </a:solidFill>
+                <a:latin typeface="+mn-lt"/>
+                <a:ea typeface="+mn-ea"/>
+                <a:cs typeface="+mn-cs"/>
+              </a:defRPr>
+            </a:lvl7pPr>
+            <a:lvl8pPr marL="3429000" indent="-228600" algn="l" defTabSz="914400" rtl="0" eaLnBrk="1" latinLnBrk="0" hangingPunct="1">
+              <a:lnSpc>
+                <a:spcPct val="90000"/>
+              </a:lnSpc>
+              <a:spcBef>
+                <a:spcPts val="500"/>
+              </a:spcBef>
+              <a:buFont typeface="Arial" panose="020B0604020202020204" pitchFamily="34" charset="0"/>
+              <a:buChar char="•"/>
+              <a:defRPr sz="1800" kern="1200">
+                <a:solidFill>
+                  <a:schemeClr val="tx1"/>
+                </a:solidFill>
+                <a:latin typeface="+mn-lt"/>
+                <a:ea typeface="+mn-ea"/>
+                <a:cs typeface="+mn-cs"/>
+              </a:defRPr>
+            </a:lvl8pPr>
+            <a:lvl9pPr marL="3886200" indent="-228600" algn="l" defTabSz="914400" rtl="0" eaLnBrk="1" latinLnBrk="0" hangingPunct="1">
+              <a:lnSpc>
+                <a:spcPct val="90000"/>
+              </a:lnSpc>
+              <a:spcBef>
+                <a:spcPts val="500"/>
+              </a:spcBef>
+              <a:buFont typeface="Arial" panose="020B0604020202020204" pitchFamily="34" charset="0"/>
+              <a:buChar char="•"/>
+              <a:defRPr sz="1800" kern="1200">
+                <a:solidFill>
+                  <a:schemeClr val="tx1"/>
+                </a:solidFill>
+                <a:latin typeface="+mn-lt"/>
+                <a:ea typeface="+mn-ea"/>
+                <a:cs typeface="+mn-cs"/>
+              </a:defRPr>
+            </a:lvl9pPr>
+          </a:lstStyle>
+          <a:p>
+            <a:pPr algn="just"/>
+            <a:r>
+              <a:rPr lang="es-ES" sz="1400" dirty="0"/>
+              <a:t>Se utilizan técnicas de aprendizaje profundo, específicamente un modelo ResNet-50 entrenado, para la extracción de características de imágenes de retina.</a:t>
+            </a:r>
+          </a:p>
+          <a:p>
+            <a:pPr algn="just"/>
+            <a:r>
+              <a:rPr lang="es-ES" sz="1400" dirty="0"/>
+              <a:t>La metodología implica el uso de Redes Neuronales Convolucionales (CNN) para la clasificación de imágenes, donde se aplican funciones de activación de Unidad Lineal Rectificada (RELU) después de cada operación de convolución.</a:t>
+            </a:r>
+            <a:endParaRPr lang="es-ES" sz="1600" dirty="0"/>
+          </a:p>
+        </p:txBody>
+      </p:sp>
+      <p:sp>
+        <p:nvSpPr>
+          <p:cNvPr id="9" name="Marcador de contenido 7">
+            <a:extLst>
+              <a:ext uri="{FF2B5EF4-FFF2-40B4-BE49-F238E27FC236}">
+                <a16:creationId xmlns:a16="http://schemas.microsoft.com/office/drawing/2014/main" id="{55662AC2-B7A2-FC2C-0AEB-3C59F14F7BDB}"/>
+              </a:ext>
+            </a:extLst>
+          </p:cNvPr>
+          <p:cNvSpPr txBox="1">
+            <a:spLocks/>
+          </p:cNvSpPr>
+          <p:nvPr/>
+        </p:nvSpPr>
+        <p:spPr>
+          <a:xfrm>
+            <a:off x="971551" y="3045486"/>
+            <a:ext cx="2743200" cy="3279114"/>
+          </a:xfrm>
+          <a:prstGeom prst="rect">
+            <a:avLst/>
+          </a:prstGeom>
+        </p:spPr>
+        <p:txBody>
+          <a:bodyPr vert="horz" lIns="91440" tIns="45720" rIns="91440" bIns="45720" rtlCol="0">
+            <a:normAutofit fontScale="85000" lnSpcReduction="20000"/>
+          </a:bodyPr>
+          <a:lstStyle>
+            <a:lvl1pPr marL="228600" indent="-228600" algn="l" defTabSz="914400" rtl="0" eaLnBrk="1" latinLnBrk="0" hangingPunct="1">
+              <a:lnSpc>
+                <a:spcPct val="120000"/>
+              </a:lnSpc>
+              <a:spcBef>
+                <a:spcPts val="1000"/>
+              </a:spcBef>
+              <a:buSzPct val="80000"/>
+              <a:buFont typeface="Arial" panose="020B0604020202020204" pitchFamily="34" charset="0"/>
+              <a:buChar char="•"/>
+              <a:defRPr sz="2000" kern="1200">
+                <a:solidFill>
+                  <a:schemeClr val="tx1"/>
+                </a:solidFill>
+                <a:latin typeface="+mn-lt"/>
+                <a:ea typeface="+mn-ea"/>
+                <a:cs typeface="+mn-cs"/>
+              </a:defRPr>
+            </a:lvl1pPr>
+            <a:lvl2pPr marL="457200" indent="-228600" algn="l" defTabSz="914400" rtl="0" eaLnBrk="1" latinLnBrk="0" hangingPunct="1">
+              <a:lnSpc>
+                <a:spcPct val="120000"/>
+              </a:lnSpc>
+              <a:spcBef>
+                <a:spcPts val="500"/>
+              </a:spcBef>
+              <a:buSzPct val="80000"/>
+              <a:buFont typeface="Avenir Next LT Pro Light" panose="020B0304020202020204" pitchFamily="34" charset="0"/>
+              <a:buChar char="–"/>
+              <a:defRPr sz="1800" kern="1200">
+                <a:solidFill>
+                  <a:schemeClr val="tx1"/>
+                </a:solidFill>
+                <a:latin typeface="+mn-lt"/>
+                <a:ea typeface="+mn-ea"/>
+                <a:cs typeface="+mn-cs"/>
+              </a:defRPr>
+            </a:lvl2pPr>
+            <a:lvl3pPr marL="731520" indent="-228600" algn="l" defTabSz="914400" rtl="0" eaLnBrk="1" latinLnBrk="0" hangingPunct="1">
+              <a:lnSpc>
+                <a:spcPct val="120000"/>
+              </a:lnSpc>
+              <a:spcBef>
+                <a:spcPts val="500"/>
+              </a:spcBef>
+              <a:buSzPct val="80000"/>
+              <a:buFont typeface="Arial" panose="020B0604020202020204" pitchFamily="34" charset="0"/>
+              <a:buChar char="•"/>
+              <a:defRPr sz="1600" kern="1200">
+                <a:solidFill>
+                  <a:schemeClr val="tx1"/>
+                </a:solidFill>
+                <a:latin typeface="+mn-lt"/>
+                <a:ea typeface="+mn-ea"/>
+                <a:cs typeface="+mn-cs"/>
+              </a:defRPr>
+            </a:lvl3pPr>
+            <a:lvl4pPr marL="1005840" indent="-228600" algn="l" defTabSz="914400" rtl="0" eaLnBrk="1" latinLnBrk="0" hangingPunct="1">
+              <a:lnSpc>
+                <a:spcPct val="120000"/>
+              </a:lnSpc>
+              <a:spcBef>
+                <a:spcPts val="500"/>
+              </a:spcBef>
+              <a:buSzPct val="80000"/>
+              <a:buFont typeface="Avenir Next LT Pro Light" panose="020B0304020202020204" pitchFamily="34" charset="0"/>
+              <a:buChar char="–"/>
+              <a:defRPr sz="1400" kern="1200">
+                <a:solidFill>
+                  <a:schemeClr val="tx1"/>
+                </a:solidFill>
+                <a:latin typeface="+mn-lt"/>
+                <a:ea typeface="+mn-ea"/>
+                <a:cs typeface="+mn-cs"/>
+              </a:defRPr>
+            </a:lvl4pPr>
+            <a:lvl5pPr marL="1280160" indent="-228600" algn="l" defTabSz="914400" rtl="0" eaLnBrk="1" latinLnBrk="0" hangingPunct="1">
+              <a:lnSpc>
+                <a:spcPct val="120000"/>
+              </a:lnSpc>
+              <a:spcBef>
+                <a:spcPts val="500"/>
+              </a:spcBef>
+              <a:buSzPct val="80000"/>
+              <a:buFont typeface="Arial" panose="020B0604020202020204" pitchFamily="34" charset="0"/>
+              <a:buChar char="•"/>
+              <a:defRPr sz="1400" kern="1200">
+                <a:solidFill>
+                  <a:schemeClr val="tx1"/>
+                </a:solidFill>
+                <a:latin typeface="+mn-lt"/>
+                <a:ea typeface="+mn-ea"/>
+                <a:cs typeface="+mn-cs"/>
+              </a:defRPr>
+            </a:lvl5pPr>
+            <a:lvl6pPr marL="2514600" indent="-228600" algn="l" defTabSz="914400" rtl="0" eaLnBrk="1" latinLnBrk="0" hangingPunct="1">
+              <a:lnSpc>
+                <a:spcPct val="90000"/>
+              </a:lnSpc>
+              <a:spcBef>
+                <a:spcPts val="500"/>
+              </a:spcBef>
+              <a:buFont typeface="Arial" panose="020B0604020202020204" pitchFamily="34" charset="0"/>
+              <a:buChar char="•"/>
+              <a:defRPr sz="1800" kern="1200">
+                <a:solidFill>
+                  <a:schemeClr val="tx1"/>
+                </a:solidFill>
+                <a:latin typeface="+mn-lt"/>
+                <a:ea typeface="+mn-ea"/>
+                <a:cs typeface="+mn-cs"/>
+              </a:defRPr>
+            </a:lvl6pPr>
+            <a:lvl7pPr marL="2971800" indent="-228600" algn="l" defTabSz="914400" rtl="0" eaLnBrk="1" latinLnBrk="0" hangingPunct="1">
+              <a:lnSpc>
+                <a:spcPct val="90000"/>
+              </a:lnSpc>
+              <a:spcBef>
+                <a:spcPts val="500"/>
+              </a:spcBef>
+              <a:buFont typeface="Arial" panose="020B0604020202020204" pitchFamily="34" charset="0"/>
+              <a:buChar char="•"/>
+              <a:defRPr sz="1800" kern="1200">
+                <a:solidFill>
+                  <a:schemeClr val="tx1"/>
+                </a:solidFill>
+                <a:latin typeface="+mn-lt"/>
+                <a:ea typeface="+mn-ea"/>
+                <a:cs typeface="+mn-cs"/>
+              </a:defRPr>
+            </a:lvl7pPr>
+            <a:lvl8pPr marL="3429000" indent="-228600" algn="l" defTabSz="914400" rtl="0" eaLnBrk="1" latinLnBrk="0" hangingPunct="1">
+              <a:lnSpc>
+                <a:spcPct val="90000"/>
+              </a:lnSpc>
+              <a:spcBef>
+                <a:spcPts val="500"/>
+              </a:spcBef>
+              <a:buFont typeface="Arial" panose="020B0604020202020204" pitchFamily="34" charset="0"/>
+              <a:buChar char="•"/>
+              <a:defRPr sz="1800" kern="1200">
+                <a:solidFill>
+                  <a:schemeClr val="tx1"/>
+                </a:solidFill>
+                <a:latin typeface="+mn-lt"/>
+                <a:ea typeface="+mn-ea"/>
+                <a:cs typeface="+mn-cs"/>
+              </a:defRPr>
+            </a:lvl8pPr>
+            <a:lvl9pPr marL="3886200" indent="-228600" algn="l" defTabSz="914400" rtl="0" eaLnBrk="1" latinLnBrk="0" hangingPunct="1">
+              <a:lnSpc>
+                <a:spcPct val="90000"/>
+              </a:lnSpc>
+              <a:spcBef>
+                <a:spcPts val="500"/>
+              </a:spcBef>
+              <a:buFont typeface="Arial" panose="020B0604020202020204" pitchFamily="34" charset="0"/>
+              <a:buChar char="•"/>
+              <a:defRPr sz="1800" kern="1200">
+                <a:solidFill>
+                  <a:schemeClr val="tx1"/>
+                </a:solidFill>
+                <a:latin typeface="+mn-lt"/>
+                <a:ea typeface="+mn-ea"/>
+                <a:cs typeface="+mn-cs"/>
+              </a:defRPr>
+            </a:lvl9pPr>
+          </a:lstStyle>
+          <a:p>
+            <a:pPr algn="just"/>
+            <a:r>
+              <a:rPr lang="es-ES" sz="1600" dirty="0"/>
+              <a:t>El objetivo principal de la investigación es detectar y clasificar la Retinopatía Diabética (RD) en etapas tempranas para reducir la necesidad de cirugías complejas.</a:t>
+            </a:r>
+          </a:p>
+          <a:p>
+            <a:pPr algn="just"/>
+            <a:r>
+              <a:rPr lang="es-ES" sz="1600" dirty="0"/>
+              <a:t>El estudio tiene como objetivo clasificar la RD en cinco etapas: sin RD, RD grave, RD moderada, RD proliferativa y RD leve utilizando técnicas de aprendizaje profundo.</a:t>
+            </a:r>
+            <a:endParaRPr lang="en-US" sz="1600" dirty="0"/>
+          </a:p>
+        </p:txBody>
+      </p:sp>
+    </p:spTree>
+    <p:extLst>
+      <p:ext uri="{BB962C8B-B14F-4D97-AF65-F5344CB8AC3E}">
+        <p14:creationId xmlns:p14="http://schemas.microsoft.com/office/powerpoint/2010/main" val="3775658813"/>
+      </p:ext>
+    </p:extLst>
+  </p:cSld>
+  <p:clrMapOvr>
+    <a:masterClrMapping/>
+  </p:clrMapOvr>
+</p:sld>
+</file>
+
+<file path=ppt/slides/slide8.xml><?xml version="1.0" encoding="utf-8"?>
+<p:sld xmlns:a="http://schemas.openxmlformats.org/drawingml/2006/main" xmlns:r="http://schemas.openxmlformats.org/officeDocument/2006/relationships" xmlns:p="http://schemas.openxmlformats.org/presentationml/2006/main">
+  <p:cSld>
+    <p:spTree>
+      <p:nvGrpSpPr>
+        <p:cNvPr id="1" name=""/>
+        <p:cNvGrpSpPr/>
+        <p:nvPr/>
+      </p:nvGrpSpPr>
+      <p:grpSpPr>
+        <a:xfrm>
+          <a:off x="0" y="0"/>
+          <a:ext cx="0" cy="0"/>
+          <a:chOff x="0" y="0"/>
+          <a:chExt cx="0" cy="0"/>
+        </a:xfrm>
+      </p:grpSpPr>
+      <p:sp>
+        <p:nvSpPr>
+          <p:cNvPr id="2" name="Título 1">
+            <a:extLst>
+              <a:ext uri="{FF2B5EF4-FFF2-40B4-BE49-F238E27FC236}">
+                <a16:creationId xmlns:a16="http://schemas.microsoft.com/office/drawing/2014/main" id="{E7A01A16-EB5D-EDFE-23D6-77D0CA512CB3}"/>
+              </a:ext>
+            </a:extLst>
+          </p:cNvPr>
+          <p:cNvSpPr>
+            <a:spLocks noGrp="1"/>
+          </p:cNvSpPr>
+          <p:nvPr>
+            <p:ph type="title"/>
+          </p:nvPr>
+        </p:nvSpPr>
+        <p:spPr>
+          <a:xfrm>
+            <a:off x="571500" y="700175"/>
+            <a:ext cx="11049000" cy="1084101"/>
+          </a:xfrm>
+        </p:spPr>
+        <p:txBody>
+          <a:bodyPr>
+            <a:noAutofit/>
+          </a:bodyPr>
+          <a:lstStyle/>
+          <a:p>
+            <a:r>
+              <a:rPr lang="en-US" sz="3200" dirty="0"/>
+              <a:t>Retinal Disease Detection Using Deep Learning Techniques: A Comprehensive Review</a:t>
+            </a:r>
+            <a:endParaRPr lang="es-ES" sz="3200" dirty="0"/>
+          </a:p>
+        </p:txBody>
+      </p:sp>
+      <p:pic>
+        <p:nvPicPr>
+          <p:cNvPr id="5" name="Imagen 4">
+            <a:extLst>
+              <a:ext uri="{FF2B5EF4-FFF2-40B4-BE49-F238E27FC236}">
+                <a16:creationId xmlns:a16="http://schemas.microsoft.com/office/drawing/2014/main" id="{CFA7A349-7250-0E9D-D149-9A091CABBAC3}"/>
+              </a:ext>
+            </a:extLst>
+          </p:cNvPr>
+          <p:cNvPicPr>
+            <a:picLocks noChangeAspect="1"/>
+          </p:cNvPicPr>
+          <p:nvPr/>
+        </p:nvPicPr>
+        <p:blipFill>
+          <a:blip r:embed="rId2"/>
+          <a:stretch>
+            <a:fillRect/>
+          </a:stretch>
+        </p:blipFill>
+        <p:spPr>
+          <a:xfrm>
+            <a:off x="9972675" y="52364"/>
+            <a:ext cx="2047959" cy="485776"/>
+          </a:xfrm>
+          <a:prstGeom prst="rect">
+            <a:avLst/>
+          </a:prstGeom>
+        </p:spPr>
+      </p:pic>
+      <p:sp>
+        <p:nvSpPr>
+          <p:cNvPr id="6" name="Título 1">
+            <a:extLst>
+              <a:ext uri="{FF2B5EF4-FFF2-40B4-BE49-F238E27FC236}">
+                <a16:creationId xmlns:a16="http://schemas.microsoft.com/office/drawing/2014/main" id="{F2D15490-C613-733D-B535-5F94C2CFFA59}"/>
+              </a:ext>
+            </a:extLst>
+          </p:cNvPr>
+          <p:cNvSpPr txBox="1">
+            <a:spLocks/>
+          </p:cNvSpPr>
+          <p:nvPr/>
+        </p:nvSpPr>
+        <p:spPr>
+          <a:xfrm>
+            <a:off x="571499" y="264818"/>
+            <a:ext cx="2295526" cy="244346"/>
+          </a:xfrm>
+          <a:prstGeom prst="rect">
+            <a:avLst/>
+          </a:prstGeom>
+        </p:spPr>
+        <p:txBody>
+          <a:bodyPr vert="horz" lIns="91440" tIns="45720" rIns="91440" bIns="45720" rtlCol="0" anchor="ctr">
+            <a:noAutofit/>
+          </a:bodyPr>
+          <a:lstStyle>
+            <a:lvl1pPr algn="l" defTabSz="914400" rtl="0" eaLnBrk="1" latinLnBrk="0" hangingPunct="1">
+              <a:lnSpc>
+                <a:spcPct val="90000"/>
+              </a:lnSpc>
+              <a:spcBef>
+                <a:spcPct val="0"/>
+              </a:spcBef>
+              <a:buNone/>
+              <a:defRPr sz="4000" kern="1200" spc="-100" baseline="0">
+                <a:solidFill>
+                  <a:schemeClr val="tx1"/>
+                </a:solidFill>
+                <a:latin typeface="Batang" panose="02030600000101010101" pitchFamily="18" charset="-127"/>
+                <a:ea typeface="Batang" panose="02030600000101010101" pitchFamily="18" charset="-127"/>
+                <a:cs typeface="+mj-cs"/>
+              </a:defRPr>
+            </a:lvl1pPr>
+          </a:lstStyle>
+          <a:p>
+            <a:r>
+              <a:rPr lang="es-PE" sz="1400" dirty="0"/>
+              <a:t>P</a:t>
+            </a:r>
+            <a:r>
+              <a:rPr lang="es-ES" sz="1400" dirty="0" err="1"/>
+              <a:t>aper</a:t>
+            </a:r>
+            <a:r>
+              <a:rPr lang="es-ES" sz="1400" dirty="0"/>
+              <a:t> relacionado 2</a:t>
+            </a:r>
+          </a:p>
+        </p:txBody>
+      </p:sp>
+      <p:sp>
+        <p:nvSpPr>
+          <p:cNvPr id="10" name="Rectángulo 9">
+            <a:extLst>
+              <a:ext uri="{FF2B5EF4-FFF2-40B4-BE49-F238E27FC236}">
+                <a16:creationId xmlns:a16="http://schemas.microsoft.com/office/drawing/2014/main" id="{6BA0718A-3228-2695-F3BE-F8D8ACB4C3F6}"/>
+              </a:ext>
+            </a:extLst>
+          </p:cNvPr>
+          <p:cNvSpPr/>
+          <p:nvPr/>
+        </p:nvSpPr>
+        <p:spPr>
+          <a:xfrm>
+            <a:off x="1601879" y="2431424"/>
+            <a:ext cx="1653992" cy="461665"/>
+          </a:xfrm>
+          <a:prstGeom prst="rect">
+            <a:avLst/>
+          </a:prstGeom>
+          <a:noFill/>
+        </p:spPr>
+        <p:txBody>
+          <a:bodyPr wrap="square" lIns="91440" tIns="45720" rIns="91440" bIns="45720">
+            <a:spAutoFit/>
+          </a:bodyPr>
+          <a:lstStyle/>
+          <a:p>
+            <a:pPr algn="ctr"/>
+            <a:r>
+              <a:rPr lang="es-PE" sz="2400" dirty="0">
+                <a:ln w="0"/>
+                <a:effectLst>
+                  <a:outerShdw blurRad="38100" dist="19050" dir="2700000" algn="tl" rotWithShape="0">
+                    <a:schemeClr val="dk1">
+                      <a:alpha val="40000"/>
+                    </a:schemeClr>
+                  </a:outerShdw>
+                </a:effectLst>
+              </a:rPr>
+              <a:t>O</a:t>
+            </a:r>
+            <a:r>
+              <a:rPr lang="es-ES" sz="2400" dirty="0" err="1">
+                <a:ln w="0"/>
+                <a:effectLst>
+                  <a:outerShdw blurRad="38100" dist="19050" dir="2700000" algn="tl" rotWithShape="0">
+                    <a:schemeClr val="dk1">
+                      <a:alpha val="40000"/>
+                    </a:schemeClr>
+                  </a:outerShdw>
+                </a:effectLst>
+              </a:rPr>
+              <a:t>bjetivos</a:t>
+            </a:r>
+            <a:endParaRPr lang="es-ES" sz="2400" b="0" cap="none" spc="0" dirty="0">
+              <a:ln w="0"/>
+              <a:solidFill>
+                <a:schemeClr val="tx1"/>
+              </a:solidFill>
+              <a:effectLst>
+                <a:outerShdw blurRad="38100" dist="19050" dir="2700000" algn="tl" rotWithShape="0">
+                  <a:schemeClr val="dk1">
+                    <a:alpha val="40000"/>
+                  </a:schemeClr>
+                </a:outerShdw>
+              </a:effectLst>
+            </a:endParaRPr>
+          </a:p>
+        </p:txBody>
+      </p:sp>
+      <p:sp>
+        <p:nvSpPr>
+          <p:cNvPr id="11" name="Rectángulo 10">
+            <a:extLst>
+              <a:ext uri="{FF2B5EF4-FFF2-40B4-BE49-F238E27FC236}">
+                <a16:creationId xmlns:a16="http://schemas.microsoft.com/office/drawing/2014/main" id="{56B91C12-7C3B-2EBD-6289-16A0400BAB0B}"/>
+              </a:ext>
+            </a:extLst>
+          </p:cNvPr>
+          <p:cNvSpPr/>
+          <p:nvPr/>
+        </p:nvSpPr>
+        <p:spPr>
+          <a:xfrm>
+            <a:off x="5025277" y="2431424"/>
+            <a:ext cx="2141446" cy="461665"/>
+          </a:xfrm>
+          <a:prstGeom prst="rect">
+            <a:avLst/>
+          </a:prstGeom>
+          <a:noFill/>
+        </p:spPr>
+        <p:txBody>
+          <a:bodyPr wrap="square" lIns="91440" tIns="45720" rIns="91440" bIns="45720">
+            <a:spAutoFit/>
+          </a:bodyPr>
+          <a:lstStyle/>
+          <a:p>
+            <a:pPr algn="ctr"/>
+            <a:r>
+              <a:rPr lang="es-PE" sz="2400" b="0" cap="none" spc="0" dirty="0">
+                <a:ln w="0"/>
+                <a:solidFill>
+                  <a:schemeClr val="tx1"/>
+                </a:solidFill>
+                <a:effectLst>
+                  <a:outerShdw blurRad="38100" dist="19050" dir="2700000" algn="tl" rotWithShape="0">
+                    <a:schemeClr val="dk1">
+                      <a:alpha val="40000"/>
+                    </a:schemeClr>
+                  </a:outerShdw>
+                </a:effectLst>
+              </a:rPr>
+              <a:t>Metodología</a:t>
+            </a:r>
+            <a:endParaRPr lang="es-ES" sz="2400" b="0" cap="none" spc="0" dirty="0">
+              <a:ln w="0"/>
+              <a:solidFill>
+                <a:schemeClr val="tx1"/>
+              </a:solidFill>
+              <a:effectLst>
+                <a:outerShdw blurRad="38100" dist="19050" dir="2700000" algn="tl" rotWithShape="0">
+                  <a:schemeClr val="dk1">
+                    <a:alpha val="40000"/>
+                  </a:schemeClr>
+                </a:outerShdw>
+              </a:effectLst>
+            </a:endParaRPr>
+          </a:p>
+        </p:txBody>
+      </p:sp>
+      <p:sp>
+        <p:nvSpPr>
+          <p:cNvPr id="12" name="Rectángulo 11">
+            <a:extLst>
+              <a:ext uri="{FF2B5EF4-FFF2-40B4-BE49-F238E27FC236}">
+                <a16:creationId xmlns:a16="http://schemas.microsoft.com/office/drawing/2014/main" id="{B912E60C-28E0-A363-F916-9CECB28373C2}"/>
+              </a:ext>
+            </a:extLst>
+          </p:cNvPr>
+          <p:cNvSpPr/>
+          <p:nvPr/>
+        </p:nvSpPr>
+        <p:spPr>
+          <a:xfrm>
+            <a:off x="9120187" y="2431424"/>
+            <a:ext cx="1704975" cy="461665"/>
+          </a:xfrm>
+          <a:prstGeom prst="rect">
+            <a:avLst/>
+          </a:prstGeom>
+          <a:noFill/>
+        </p:spPr>
+        <p:txBody>
+          <a:bodyPr wrap="square" lIns="91440" tIns="45720" rIns="91440" bIns="45720">
+            <a:spAutoFit/>
+          </a:bodyPr>
+          <a:lstStyle/>
+          <a:p>
+            <a:pPr algn="ctr"/>
+            <a:r>
+              <a:rPr lang="es-PE" sz="2400" dirty="0">
+                <a:ln w="0"/>
+                <a:effectLst>
+                  <a:outerShdw blurRad="38100" dist="19050" dir="2700000" algn="tl" rotWithShape="0">
+                    <a:schemeClr val="dk1">
+                      <a:alpha val="40000"/>
+                    </a:schemeClr>
+                  </a:outerShdw>
+                </a:effectLst>
+              </a:rPr>
+              <a:t>Resultados</a:t>
+            </a:r>
+            <a:endParaRPr lang="es-ES" sz="2400" b="0" cap="none" spc="0" dirty="0">
+              <a:ln w="0"/>
+              <a:solidFill>
+                <a:schemeClr val="tx1"/>
+              </a:solidFill>
+              <a:effectLst>
+                <a:outerShdw blurRad="38100" dist="19050" dir="2700000" algn="tl" rotWithShape="0">
+                  <a:schemeClr val="dk1">
+                    <a:alpha val="40000"/>
+                  </a:schemeClr>
+                </a:outerShdw>
+              </a:effectLst>
+            </a:endParaRPr>
+          </a:p>
+        </p:txBody>
+      </p:sp>
+      <p:sp>
+        <p:nvSpPr>
+          <p:cNvPr id="4" name="Marcador de contenido 7">
+            <a:extLst>
+              <a:ext uri="{FF2B5EF4-FFF2-40B4-BE49-F238E27FC236}">
+                <a16:creationId xmlns:a16="http://schemas.microsoft.com/office/drawing/2014/main" id="{780BD072-81D5-55D6-D27F-101238DD8926}"/>
+              </a:ext>
+            </a:extLst>
+          </p:cNvPr>
+          <p:cNvSpPr txBox="1">
+            <a:spLocks/>
+          </p:cNvSpPr>
+          <p:nvPr/>
+        </p:nvSpPr>
+        <p:spPr>
+          <a:xfrm>
+            <a:off x="8477251" y="3045487"/>
+            <a:ext cx="2743200" cy="3279114"/>
+          </a:xfrm>
+          <a:prstGeom prst="rect">
+            <a:avLst/>
+          </a:prstGeom>
+        </p:spPr>
+        <p:txBody>
+          <a:bodyPr vert="horz" lIns="91440" tIns="45720" rIns="91440" bIns="45720" rtlCol="0">
+            <a:normAutofit fontScale="85000" lnSpcReduction="20000"/>
+          </a:bodyPr>
+          <a:lstStyle>
+            <a:lvl1pPr marL="228600" indent="-228600" algn="l" defTabSz="914400" rtl="0" eaLnBrk="1" latinLnBrk="0" hangingPunct="1">
+              <a:lnSpc>
+                <a:spcPct val="120000"/>
+              </a:lnSpc>
+              <a:spcBef>
+                <a:spcPts val="1000"/>
+              </a:spcBef>
+              <a:buSzPct val="80000"/>
+              <a:buFont typeface="Arial" panose="020B0604020202020204" pitchFamily="34" charset="0"/>
+              <a:buChar char="•"/>
+              <a:defRPr sz="2000" kern="1200">
+                <a:solidFill>
+                  <a:schemeClr val="tx1"/>
+                </a:solidFill>
+                <a:latin typeface="+mn-lt"/>
+                <a:ea typeface="+mn-ea"/>
+                <a:cs typeface="+mn-cs"/>
+              </a:defRPr>
+            </a:lvl1pPr>
+            <a:lvl2pPr marL="457200" indent="-228600" algn="l" defTabSz="914400" rtl="0" eaLnBrk="1" latinLnBrk="0" hangingPunct="1">
+              <a:lnSpc>
+                <a:spcPct val="120000"/>
+              </a:lnSpc>
+              <a:spcBef>
+                <a:spcPts val="500"/>
+              </a:spcBef>
+              <a:buSzPct val="80000"/>
+              <a:buFont typeface="Avenir Next LT Pro Light" panose="020B0304020202020204" pitchFamily="34" charset="0"/>
+              <a:buChar char="–"/>
+              <a:defRPr sz="1800" kern="1200">
+                <a:solidFill>
+                  <a:schemeClr val="tx1"/>
+                </a:solidFill>
+                <a:latin typeface="+mn-lt"/>
+                <a:ea typeface="+mn-ea"/>
+                <a:cs typeface="+mn-cs"/>
+              </a:defRPr>
+            </a:lvl2pPr>
+            <a:lvl3pPr marL="731520" indent="-228600" algn="l" defTabSz="914400" rtl="0" eaLnBrk="1" latinLnBrk="0" hangingPunct="1">
+              <a:lnSpc>
+                <a:spcPct val="120000"/>
+              </a:lnSpc>
+              <a:spcBef>
+                <a:spcPts val="500"/>
+              </a:spcBef>
+              <a:buSzPct val="80000"/>
+              <a:buFont typeface="Arial" panose="020B0604020202020204" pitchFamily="34" charset="0"/>
+              <a:buChar char="•"/>
+              <a:defRPr sz="1600" kern="1200">
+                <a:solidFill>
+                  <a:schemeClr val="tx1"/>
+                </a:solidFill>
+                <a:latin typeface="+mn-lt"/>
+                <a:ea typeface="+mn-ea"/>
+                <a:cs typeface="+mn-cs"/>
+              </a:defRPr>
+            </a:lvl3pPr>
+            <a:lvl4pPr marL="1005840" indent="-228600" algn="l" defTabSz="914400" rtl="0" eaLnBrk="1" latinLnBrk="0" hangingPunct="1">
+              <a:lnSpc>
+                <a:spcPct val="120000"/>
+              </a:lnSpc>
+              <a:spcBef>
+                <a:spcPts val="500"/>
+              </a:spcBef>
+              <a:buSzPct val="80000"/>
+              <a:buFont typeface="Avenir Next LT Pro Light" panose="020B0304020202020204" pitchFamily="34" charset="0"/>
+              <a:buChar char="–"/>
+              <a:defRPr sz="1400" kern="1200">
+                <a:solidFill>
+                  <a:schemeClr val="tx1"/>
+                </a:solidFill>
+                <a:latin typeface="+mn-lt"/>
+                <a:ea typeface="+mn-ea"/>
+                <a:cs typeface="+mn-cs"/>
+              </a:defRPr>
+            </a:lvl4pPr>
+            <a:lvl5pPr marL="1280160" indent="-228600" algn="l" defTabSz="914400" rtl="0" eaLnBrk="1" latinLnBrk="0" hangingPunct="1">
+              <a:lnSpc>
+                <a:spcPct val="120000"/>
+              </a:lnSpc>
+              <a:spcBef>
+                <a:spcPts val="500"/>
+              </a:spcBef>
+              <a:buSzPct val="80000"/>
+              <a:buFont typeface="Arial" panose="020B0604020202020204" pitchFamily="34" charset="0"/>
+              <a:buChar char="•"/>
+              <a:defRPr sz="1400" kern="1200">
+                <a:solidFill>
+                  <a:schemeClr val="tx1"/>
+                </a:solidFill>
+                <a:latin typeface="+mn-lt"/>
+                <a:ea typeface="+mn-ea"/>
+                <a:cs typeface="+mn-cs"/>
+              </a:defRPr>
+            </a:lvl5pPr>
+            <a:lvl6pPr marL="2514600" indent="-228600" algn="l" defTabSz="914400" rtl="0" eaLnBrk="1" latinLnBrk="0" hangingPunct="1">
+              <a:lnSpc>
+                <a:spcPct val="90000"/>
+              </a:lnSpc>
+              <a:spcBef>
+                <a:spcPts val="500"/>
+              </a:spcBef>
+              <a:buFont typeface="Arial" panose="020B0604020202020204" pitchFamily="34" charset="0"/>
+              <a:buChar char="•"/>
+              <a:defRPr sz="1800" kern="1200">
+                <a:solidFill>
+                  <a:schemeClr val="tx1"/>
+                </a:solidFill>
+                <a:latin typeface="+mn-lt"/>
+                <a:ea typeface="+mn-ea"/>
+                <a:cs typeface="+mn-cs"/>
+              </a:defRPr>
+            </a:lvl6pPr>
+            <a:lvl7pPr marL="2971800" indent="-228600" algn="l" defTabSz="914400" rtl="0" eaLnBrk="1" latinLnBrk="0" hangingPunct="1">
+              <a:lnSpc>
+                <a:spcPct val="90000"/>
+              </a:lnSpc>
+              <a:spcBef>
+                <a:spcPts val="500"/>
+              </a:spcBef>
+              <a:buFont typeface="Arial" panose="020B0604020202020204" pitchFamily="34" charset="0"/>
+              <a:buChar char="•"/>
+              <a:defRPr sz="1800" kern="1200">
+                <a:solidFill>
+                  <a:schemeClr val="tx1"/>
+                </a:solidFill>
+                <a:latin typeface="+mn-lt"/>
+                <a:ea typeface="+mn-ea"/>
+                <a:cs typeface="+mn-cs"/>
+              </a:defRPr>
+            </a:lvl7pPr>
+            <a:lvl8pPr marL="3429000" indent="-228600" algn="l" defTabSz="914400" rtl="0" eaLnBrk="1" latinLnBrk="0" hangingPunct="1">
+              <a:lnSpc>
+                <a:spcPct val="90000"/>
+              </a:lnSpc>
+              <a:spcBef>
+                <a:spcPts val="500"/>
+              </a:spcBef>
+              <a:buFont typeface="Arial" panose="020B0604020202020204" pitchFamily="34" charset="0"/>
+              <a:buChar char="•"/>
+              <a:defRPr sz="1800" kern="1200">
+                <a:solidFill>
+                  <a:schemeClr val="tx1"/>
+                </a:solidFill>
+                <a:latin typeface="+mn-lt"/>
+                <a:ea typeface="+mn-ea"/>
+                <a:cs typeface="+mn-cs"/>
+              </a:defRPr>
+            </a:lvl8pPr>
+            <a:lvl9pPr marL="3886200" indent="-228600" algn="l" defTabSz="914400" rtl="0" eaLnBrk="1" latinLnBrk="0" hangingPunct="1">
+              <a:lnSpc>
+                <a:spcPct val="90000"/>
+              </a:lnSpc>
+              <a:spcBef>
+                <a:spcPts val="500"/>
+              </a:spcBef>
+              <a:buFont typeface="Arial" panose="020B0604020202020204" pitchFamily="34" charset="0"/>
+              <a:buChar char="•"/>
+              <a:defRPr sz="1800" kern="1200">
+                <a:solidFill>
+                  <a:schemeClr val="tx1"/>
+                </a:solidFill>
+                <a:latin typeface="+mn-lt"/>
+                <a:ea typeface="+mn-ea"/>
+                <a:cs typeface="+mn-cs"/>
+              </a:defRPr>
+            </a:lvl9pPr>
+          </a:lstStyle>
+          <a:p>
+            <a:pPr algn="just"/>
+            <a:r>
+              <a:rPr lang="es-ES" sz="1600" dirty="0"/>
+              <a:t>La investigación concluyó que el CAD, impulsado por el aprendizaje profundo, desempeñará un papel crucial como tecnología de asistencia en la detección y clasificación de enfermedades de la retina.</a:t>
+            </a:r>
+          </a:p>
+          <a:p>
+            <a:pPr algn="just"/>
+            <a:r>
+              <a:rPr lang="es-ES" sz="1600" dirty="0"/>
+              <a:t>Se reconocieron los desafíos en la detección automatizada de enfermedades debido a la naturaleza compleja de las lesiones de la retina.</a:t>
+            </a:r>
+          </a:p>
+        </p:txBody>
+      </p:sp>
+      <p:sp>
+        <p:nvSpPr>
+          <p:cNvPr id="7" name="Marcador de contenido 7">
+            <a:extLst>
+              <a:ext uri="{FF2B5EF4-FFF2-40B4-BE49-F238E27FC236}">
+                <a16:creationId xmlns:a16="http://schemas.microsoft.com/office/drawing/2014/main" id="{E0121BB7-FF79-C541-F79F-B8C5ACAF862A}"/>
+              </a:ext>
+            </a:extLst>
+          </p:cNvPr>
+          <p:cNvSpPr txBox="1">
+            <a:spLocks/>
+          </p:cNvSpPr>
+          <p:nvPr/>
+        </p:nvSpPr>
+        <p:spPr>
+          <a:xfrm>
+            <a:off x="4724401" y="3045485"/>
+            <a:ext cx="2743200" cy="3112340"/>
+          </a:xfrm>
+          <a:prstGeom prst="rect">
+            <a:avLst/>
+          </a:prstGeom>
+        </p:spPr>
+        <p:txBody>
+          <a:bodyPr vert="horz" lIns="91440" tIns="45720" rIns="91440" bIns="45720" rtlCol="0">
+            <a:normAutofit fontScale="92500" lnSpcReduction="10000"/>
+          </a:bodyPr>
+          <a:lstStyle>
+            <a:lvl1pPr marL="228600" indent="-228600" algn="l" defTabSz="914400" rtl="0" eaLnBrk="1" latinLnBrk="0" hangingPunct="1">
+              <a:lnSpc>
+                <a:spcPct val="120000"/>
+              </a:lnSpc>
+              <a:spcBef>
+                <a:spcPts val="1000"/>
+              </a:spcBef>
+              <a:buSzPct val="80000"/>
+              <a:buFont typeface="Arial" panose="020B0604020202020204" pitchFamily="34" charset="0"/>
+              <a:buChar char="•"/>
+              <a:defRPr sz="2000" kern="1200">
+                <a:solidFill>
+                  <a:schemeClr val="tx1"/>
+                </a:solidFill>
+                <a:latin typeface="+mn-lt"/>
+                <a:ea typeface="+mn-ea"/>
+                <a:cs typeface="+mn-cs"/>
+              </a:defRPr>
+            </a:lvl1pPr>
+            <a:lvl2pPr marL="457200" indent="-228600" algn="l" defTabSz="914400" rtl="0" eaLnBrk="1" latinLnBrk="0" hangingPunct="1">
+              <a:lnSpc>
+                <a:spcPct val="120000"/>
+              </a:lnSpc>
+              <a:spcBef>
+                <a:spcPts val="500"/>
+              </a:spcBef>
+              <a:buSzPct val="80000"/>
+              <a:buFont typeface="Avenir Next LT Pro Light" panose="020B0304020202020204" pitchFamily="34" charset="0"/>
+              <a:buChar char="–"/>
+              <a:defRPr sz="1800" kern="1200">
+                <a:solidFill>
+                  <a:schemeClr val="tx1"/>
+                </a:solidFill>
+                <a:latin typeface="+mn-lt"/>
+                <a:ea typeface="+mn-ea"/>
+                <a:cs typeface="+mn-cs"/>
+              </a:defRPr>
+            </a:lvl2pPr>
+            <a:lvl3pPr marL="731520" indent="-228600" algn="l" defTabSz="914400" rtl="0" eaLnBrk="1" latinLnBrk="0" hangingPunct="1">
+              <a:lnSpc>
+                <a:spcPct val="120000"/>
+              </a:lnSpc>
+              <a:spcBef>
+                <a:spcPts val="500"/>
+              </a:spcBef>
+              <a:buSzPct val="80000"/>
+              <a:buFont typeface="Arial" panose="020B0604020202020204" pitchFamily="34" charset="0"/>
+              <a:buChar char="•"/>
+              <a:defRPr sz="1600" kern="1200">
+                <a:solidFill>
+                  <a:schemeClr val="tx1"/>
+                </a:solidFill>
+                <a:latin typeface="+mn-lt"/>
+                <a:ea typeface="+mn-ea"/>
+                <a:cs typeface="+mn-cs"/>
+              </a:defRPr>
+            </a:lvl3pPr>
+            <a:lvl4pPr marL="1005840" indent="-228600" algn="l" defTabSz="914400" rtl="0" eaLnBrk="1" latinLnBrk="0" hangingPunct="1">
+              <a:lnSpc>
+                <a:spcPct val="120000"/>
+              </a:lnSpc>
+              <a:spcBef>
+                <a:spcPts val="500"/>
+              </a:spcBef>
+              <a:buSzPct val="80000"/>
+              <a:buFont typeface="Avenir Next LT Pro Light" panose="020B0304020202020204" pitchFamily="34" charset="0"/>
+              <a:buChar char="–"/>
+              <a:defRPr sz="1400" kern="1200">
+                <a:solidFill>
+                  <a:schemeClr val="tx1"/>
+                </a:solidFill>
+                <a:latin typeface="+mn-lt"/>
+                <a:ea typeface="+mn-ea"/>
+                <a:cs typeface="+mn-cs"/>
+              </a:defRPr>
+            </a:lvl4pPr>
+            <a:lvl5pPr marL="1280160" indent="-228600" algn="l" defTabSz="914400" rtl="0" eaLnBrk="1" latinLnBrk="0" hangingPunct="1">
+              <a:lnSpc>
+                <a:spcPct val="120000"/>
+              </a:lnSpc>
+              <a:spcBef>
+                <a:spcPts val="500"/>
+              </a:spcBef>
+              <a:buSzPct val="80000"/>
+              <a:buFont typeface="Arial" panose="020B0604020202020204" pitchFamily="34" charset="0"/>
+              <a:buChar char="•"/>
+              <a:defRPr sz="1400" kern="1200">
+                <a:solidFill>
+                  <a:schemeClr val="tx1"/>
+                </a:solidFill>
+                <a:latin typeface="+mn-lt"/>
+                <a:ea typeface="+mn-ea"/>
+                <a:cs typeface="+mn-cs"/>
+              </a:defRPr>
+            </a:lvl5pPr>
+            <a:lvl6pPr marL="2514600" indent="-228600" algn="l" defTabSz="914400" rtl="0" eaLnBrk="1" latinLnBrk="0" hangingPunct="1">
+              <a:lnSpc>
+                <a:spcPct val="90000"/>
+              </a:lnSpc>
+              <a:spcBef>
+                <a:spcPts val="500"/>
+              </a:spcBef>
+              <a:buFont typeface="Arial" panose="020B0604020202020204" pitchFamily="34" charset="0"/>
+              <a:buChar char="•"/>
+              <a:defRPr sz="1800" kern="1200">
+                <a:solidFill>
+                  <a:schemeClr val="tx1"/>
+                </a:solidFill>
+                <a:latin typeface="+mn-lt"/>
+                <a:ea typeface="+mn-ea"/>
+                <a:cs typeface="+mn-cs"/>
+              </a:defRPr>
+            </a:lvl6pPr>
+            <a:lvl7pPr marL="2971800" indent="-228600" algn="l" defTabSz="914400" rtl="0" eaLnBrk="1" latinLnBrk="0" hangingPunct="1">
+              <a:lnSpc>
+                <a:spcPct val="90000"/>
+              </a:lnSpc>
+              <a:spcBef>
+                <a:spcPts val="500"/>
+              </a:spcBef>
+              <a:buFont typeface="Arial" panose="020B0604020202020204" pitchFamily="34" charset="0"/>
+              <a:buChar char="•"/>
+              <a:defRPr sz="1800" kern="1200">
+                <a:solidFill>
+                  <a:schemeClr val="tx1"/>
+                </a:solidFill>
+                <a:latin typeface="+mn-lt"/>
+                <a:ea typeface="+mn-ea"/>
+                <a:cs typeface="+mn-cs"/>
+              </a:defRPr>
+            </a:lvl7pPr>
+            <a:lvl8pPr marL="3429000" indent="-228600" algn="l" defTabSz="914400" rtl="0" eaLnBrk="1" latinLnBrk="0" hangingPunct="1">
+              <a:lnSpc>
+                <a:spcPct val="90000"/>
+              </a:lnSpc>
+              <a:spcBef>
+                <a:spcPts val="500"/>
+              </a:spcBef>
+              <a:buFont typeface="Arial" panose="020B0604020202020204" pitchFamily="34" charset="0"/>
+              <a:buChar char="•"/>
+              <a:defRPr sz="1800" kern="1200">
+                <a:solidFill>
+                  <a:schemeClr val="tx1"/>
+                </a:solidFill>
+                <a:latin typeface="+mn-lt"/>
+                <a:ea typeface="+mn-ea"/>
+                <a:cs typeface="+mn-cs"/>
+              </a:defRPr>
+            </a:lvl8pPr>
+            <a:lvl9pPr marL="3886200" indent="-228600" algn="l" defTabSz="914400" rtl="0" eaLnBrk="1" latinLnBrk="0" hangingPunct="1">
+              <a:lnSpc>
+                <a:spcPct val="90000"/>
+              </a:lnSpc>
+              <a:spcBef>
+                <a:spcPts val="500"/>
+              </a:spcBef>
+              <a:buFont typeface="Arial" panose="020B0604020202020204" pitchFamily="34" charset="0"/>
+              <a:buChar char="•"/>
+              <a:defRPr sz="1800" kern="1200">
+                <a:solidFill>
+                  <a:schemeClr val="tx1"/>
+                </a:solidFill>
+                <a:latin typeface="+mn-lt"/>
+                <a:ea typeface="+mn-ea"/>
+                <a:cs typeface="+mn-cs"/>
+              </a:defRPr>
+            </a:lvl9pPr>
+          </a:lstStyle>
+          <a:p>
+            <a:pPr algn="just"/>
+            <a:r>
+              <a:rPr lang="es-ES" sz="1400" dirty="0"/>
+              <a:t>Las redes neuronales convolucionales profundas (DCNN) y los transformadores de visión (</a:t>
+            </a:r>
+            <a:r>
+              <a:rPr lang="es-ES" sz="1400" dirty="0" err="1"/>
+              <a:t>ViT</a:t>
+            </a:r>
+            <a:r>
+              <a:rPr lang="es-ES" sz="1400" dirty="0"/>
+              <a:t>) se destacaron como tecnologías clave para el diagnóstico asistido por computadora (CAD) en enfermedades de la retina.</a:t>
+            </a:r>
+          </a:p>
+          <a:p>
+            <a:pPr algn="just"/>
+            <a:r>
+              <a:rPr lang="es-ES" sz="1300" dirty="0"/>
+              <a:t>El estudio propuso la exploración de arquitecturas CNN de conjunto para mejorar el rendimiento en tareas multiclase y </a:t>
+            </a:r>
+            <a:r>
+              <a:rPr lang="es-ES" sz="1300" dirty="0" err="1"/>
+              <a:t>multietiqueta</a:t>
+            </a:r>
+            <a:r>
+              <a:rPr lang="es-ES" sz="1300" dirty="0"/>
+              <a:t>.</a:t>
+            </a:r>
+          </a:p>
+        </p:txBody>
+      </p:sp>
+      <p:sp>
+        <p:nvSpPr>
+          <p:cNvPr id="9" name="Marcador de contenido 7">
+            <a:extLst>
+              <a:ext uri="{FF2B5EF4-FFF2-40B4-BE49-F238E27FC236}">
+                <a16:creationId xmlns:a16="http://schemas.microsoft.com/office/drawing/2014/main" id="{55662AC2-B7A2-FC2C-0AEB-3C59F14F7BDB}"/>
+              </a:ext>
+            </a:extLst>
+          </p:cNvPr>
+          <p:cNvSpPr txBox="1">
+            <a:spLocks/>
+          </p:cNvSpPr>
+          <p:nvPr/>
+        </p:nvSpPr>
+        <p:spPr>
+          <a:xfrm>
+            <a:off x="971551" y="3045486"/>
+            <a:ext cx="2743200" cy="3279114"/>
+          </a:xfrm>
+          <a:prstGeom prst="rect">
+            <a:avLst/>
+          </a:prstGeom>
+        </p:spPr>
+        <p:txBody>
+          <a:bodyPr vert="horz" lIns="91440" tIns="45720" rIns="91440" bIns="45720" rtlCol="0">
+            <a:normAutofit fontScale="92500"/>
+          </a:bodyPr>
+          <a:lstStyle>
+            <a:lvl1pPr marL="228600" indent="-228600" algn="l" defTabSz="914400" rtl="0" eaLnBrk="1" latinLnBrk="0" hangingPunct="1">
+              <a:lnSpc>
+                <a:spcPct val="120000"/>
+              </a:lnSpc>
+              <a:spcBef>
+                <a:spcPts val="1000"/>
+              </a:spcBef>
+              <a:buSzPct val="80000"/>
+              <a:buFont typeface="Arial" panose="020B0604020202020204" pitchFamily="34" charset="0"/>
+              <a:buChar char="•"/>
+              <a:defRPr sz="2000" kern="1200">
+                <a:solidFill>
+                  <a:schemeClr val="tx1"/>
+                </a:solidFill>
+                <a:latin typeface="+mn-lt"/>
+                <a:ea typeface="+mn-ea"/>
+                <a:cs typeface="+mn-cs"/>
+              </a:defRPr>
+            </a:lvl1pPr>
+            <a:lvl2pPr marL="457200" indent="-228600" algn="l" defTabSz="914400" rtl="0" eaLnBrk="1" latinLnBrk="0" hangingPunct="1">
+              <a:lnSpc>
+                <a:spcPct val="120000"/>
+              </a:lnSpc>
+              <a:spcBef>
+                <a:spcPts val="500"/>
+              </a:spcBef>
+              <a:buSzPct val="80000"/>
+              <a:buFont typeface="Avenir Next LT Pro Light" panose="020B0304020202020204" pitchFamily="34" charset="0"/>
+              <a:buChar char="–"/>
+              <a:defRPr sz="1800" kern="1200">
+                <a:solidFill>
+                  <a:schemeClr val="tx1"/>
+                </a:solidFill>
+                <a:latin typeface="+mn-lt"/>
+                <a:ea typeface="+mn-ea"/>
+                <a:cs typeface="+mn-cs"/>
+              </a:defRPr>
+            </a:lvl2pPr>
+            <a:lvl3pPr marL="731520" indent="-228600" algn="l" defTabSz="914400" rtl="0" eaLnBrk="1" latinLnBrk="0" hangingPunct="1">
+              <a:lnSpc>
+                <a:spcPct val="120000"/>
+              </a:lnSpc>
+              <a:spcBef>
+                <a:spcPts val="500"/>
+              </a:spcBef>
+              <a:buSzPct val="80000"/>
+              <a:buFont typeface="Arial" panose="020B0604020202020204" pitchFamily="34" charset="0"/>
+              <a:buChar char="•"/>
+              <a:defRPr sz="1600" kern="1200">
+                <a:solidFill>
+                  <a:schemeClr val="tx1"/>
+                </a:solidFill>
+                <a:latin typeface="+mn-lt"/>
+                <a:ea typeface="+mn-ea"/>
+                <a:cs typeface="+mn-cs"/>
+              </a:defRPr>
+            </a:lvl3pPr>
+            <a:lvl4pPr marL="1005840" indent="-228600" algn="l" defTabSz="914400" rtl="0" eaLnBrk="1" latinLnBrk="0" hangingPunct="1">
+              <a:lnSpc>
+                <a:spcPct val="120000"/>
+              </a:lnSpc>
+              <a:spcBef>
+                <a:spcPts val="500"/>
+              </a:spcBef>
+              <a:buSzPct val="80000"/>
+              <a:buFont typeface="Avenir Next LT Pro Light" panose="020B0304020202020204" pitchFamily="34" charset="0"/>
+              <a:buChar char="–"/>
+              <a:defRPr sz="1400" kern="1200">
+                <a:solidFill>
+                  <a:schemeClr val="tx1"/>
+                </a:solidFill>
+                <a:latin typeface="+mn-lt"/>
+                <a:ea typeface="+mn-ea"/>
+                <a:cs typeface="+mn-cs"/>
+              </a:defRPr>
+            </a:lvl4pPr>
+            <a:lvl5pPr marL="1280160" indent="-228600" algn="l" defTabSz="914400" rtl="0" eaLnBrk="1" latinLnBrk="0" hangingPunct="1">
+              <a:lnSpc>
+                <a:spcPct val="120000"/>
+              </a:lnSpc>
+              <a:spcBef>
+                <a:spcPts val="500"/>
+              </a:spcBef>
+              <a:buSzPct val="80000"/>
+              <a:buFont typeface="Arial" panose="020B0604020202020204" pitchFamily="34" charset="0"/>
+              <a:buChar char="•"/>
+              <a:defRPr sz="1400" kern="1200">
+                <a:solidFill>
+                  <a:schemeClr val="tx1"/>
+                </a:solidFill>
+                <a:latin typeface="+mn-lt"/>
+                <a:ea typeface="+mn-ea"/>
+                <a:cs typeface="+mn-cs"/>
+              </a:defRPr>
+            </a:lvl5pPr>
+            <a:lvl6pPr marL="2514600" indent="-228600" algn="l" defTabSz="914400" rtl="0" eaLnBrk="1" latinLnBrk="0" hangingPunct="1">
+              <a:lnSpc>
+                <a:spcPct val="90000"/>
+              </a:lnSpc>
+              <a:spcBef>
+                <a:spcPts val="500"/>
+              </a:spcBef>
+              <a:buFont typeface="Arial" panose="020B0604020202020204" pitchFamily="34" charset="0"/>
+              <a:buChar char="•"/>
+              <a:defRPr sz="1800" kern="1200">
+                <a:solidFill>
+                  <a:schemeClr val="tx1"/>
+                </a:solidFill>
+                <a:latin typeface="+mn-lt"/>
+                <a:ea typeface="+mn-ea"/>
+                <a:cs typeface="+mn-cs"/>
+              </a:defRPr>
+            </a:lvl6pPr>
+            <a:lvl7pPr marL="2971800" indent="-228600" algn="l" defTabSz="914400" rtl="0" eaLnBrk="1" latinLnBrk="0" hangingPunct="1">
+              <a:lnSpc>
+                <a:spcPct val="90000"/>
+              </a:lnSpc>
+              <a:spcBef>
+                <a:spcPts val="500"/>
+              </a:spcBef>
+              <a:buFont typeface="Arial" panose="020B0604020202020204" pitchFamily="34" charset="0"/>
+              <a:buChar char="•"/>
+              <a:defRPr sz="1800" kern="1200">
+                <a:solidFill>
+                  <a:schemeClr val="tx1"/>
+                </a:solidFill>
+                <a:latin typeface="+mn-lt"/>
+                <a:ea typeface="+mn-ea"/>
+                <a:cs typeface="+mn-cs"/>
+              </a:defRPr>
+            </a:lvl7pPr>
+            <a:lvl8pPr marL="3429000" indent="-228600" algn="l" defTabSz="914400" rtl="0" eaLnBrk="1" latinLnBrk="0" hangingPunct="1">
+              <a:lnSpc>
+                <a:spcPct val="90000"/>
+              </a:lnSpc>
+              <a:spcBef>
+                <a:spcPts val="500"/>
+              </a:spcBef>
+              <a:buFont typeface="Arial" panose="020B0604020202020204" pitchFamily="34" charset="0"/>
+              <a:buChar char="•"/>
+              <a:defRPr sz="1800" kern="1200">
+                <a:solidFill>
+                  <a:schemeClr val="tx1"/>
+                </a:solidFill>
+                <a:latin typeface="+mn-lt"/>
+                <a:ea typeface="+mn-ea"/>
+                <a:cs typeface="+mn-cs"/>
+              </a:defRPr>
+            </a:lvl8pPr>
+            <a:lvl9pPr marL="3886200" indent="-228600" algn="l" defTabSz="914400" rtl="0" eaLnBrk="1" latinLnBrk="0" hangingPunct="1">
+              <a:lnSpc>
+                <a:spcPct val="90000"/>
+              </a:lnSpc>
+              <a:spcBef>
+                <a:spcPts val="500"/>
+              </a:spcBef>
+              <a:buFont typeface="Arial" panose="020B0604020202020204" pitchFamily="34" charset="0"/>
+              <a:buChar char="•"/>
+              <a:defRPr sz="1800" kern="1200">
+                <a:solidFill>
+                  <a:schemeClr val="tx1"/>
+                </a:solidFill>
+                <a:latin typeface="+mn-lt"/>
+                <a:ea typeface="+mn-ea"/>
+                <a:cs typeface="+mn-cs"/>
+              </a:defRPr>
+            </a:lvl9pPr>
+          </a:lstStyle>
+          <a:p>
+            <a:pPr algn="just"/>
+            <a:r>
+              <a:rPr lang="es-ES" sz="1600" dirty="0"/>
+              <a:t>La investigación tuvo como objetivo revisar patologías retinianas comunes, discutir modalidades de imágenes prevalentes y evaluar la investigación actual de aprendizaje profundo para detectar y clasificar diversas enfermedades de la retina.</a:t>
+            </a:r>
+          </a:p>
+        </p:txBody>
+      </p:sp>
+    </p:spTree>
+    <p:extLst>
+      <p:ext uri="{BB962C8B-B14F-4D97-AF65-F5344CB8AC3E}">
+        <p14:creationId xmlns:p14="http://schemas.microsoft.com/office/powerpoint/2010/main" val="738561146"/>
+      </p:ext>
+    </p:extLst>
+  </p:cSld>
+  <p:clrMapOvr>
+    <a:masterClrMapping/>
+  </p:clrMapOvr>
+</p:sld>
+</file>
+
 <file path=ppt/theme/theme1.xml><?xml version="1.0" encoding="utf-8"?>
 <a:theme xmlns:a="http://schemas.openxmlformats.org/drawingml/2006/main" name="AlignmentVTI">
   <a:themeElements>

</xml_diff>